<commit_message>
Nomina PDF[ADMIN] && ASEOMATIC.PPTX[UPDATECASEUSE]
</commit_message>
<xml_diff>
--- a/Documentation/AseoMatic.pptx
+++ b/Documentation/AseoMatic.pptx
@@ -312,7 +312,7 @@
       </p15:notesGuideLst>
     </p:ext>
     <p:ext uri="http://customooxmlschemas.google.com/">
-      <go:slidesCustomData xmlns:go="http://customooxmlschemas.google.com/" xmlns:p15="http://schemas.microsoft.com/office/powerpoint/2012/main" xmlns:p14="http://schemas.microsoft.com/office/powerpoint/2010/main" xmlns:com="http://schemas.openxmlformats.org/drawingml/2006/compatibility" xmlns:pvml="urn:schemas-microsoft-com:office:powerpoint" xmlns:v="urn:schemas-microsoft-com:vml" xmlns:o="urn:schemas-microsoft-com:office:office" xmlns:dgm="http://schemas.openxmlformats.org/drawingml/2006/diagram" xmlns:c="http://schemas.openxmlformats.org/drawingml/2006/chart" xmlns:mv="urn:schemas-microsoft-com:mac:vml" xmlns:mc="http://schemas.openxmlformats.org/markup-compatibility/2006" xmlns="" r:id="rId46" roundtripDataSignature="AMtx7mhjJmz1Vlyn02yKCHItcX+SGp0+8Q=="/>
+      <go:slidesCustomData xmlns="" xmlns:mc="http://schemas.openxmlformats.org/markup-compatibility/2006" xmlns:mv="urn:schemas-microsoft-com:mac:vml" xmlns:c="http://schemas.openxmlformats.org/drawingml/2006/chart" xmlns:dgm="http://schemas.openxmlformats.org/drawingml/2006/diagram" xmlns:o="urn:schemas-microsoft-com:office:office" xmlns:v="urn:schemas-microsoft-com:vml" xmlns:pvml="urn:schemas-microsoft-com:office:powerpoint" xmlns:com="http://schemas.openxmlformats.org/drawingml/2006/compatibility" xmlns:p14="http://schemas.microsoft.com/office/powerpoint/2010/main" xmlns:p15="http://schemas.microsoft.com/office/powerpoint/2012/main" xmlns:go="http://customooxmlschemas.google.com/" r:id="rId46" roundtripDataSignature="AMtx7mhjJmz1Vlyn02yKCHItcX+SGp0+8Q=="/>
     </p:ext>
   </p:extLst>
 </p:presentation>
@@ -9721,19 +9721,7 @@
                 <a:cs typeface="Calibri"/>
                 <a:sym typeface="Calibri"/>
               </a:rPr>
-              <a:t>Este proyecto se centra en la implementación de un sistema de información que busca reducir los tiempos del proceso actual de la empresa Equidad S.A.S  donde se establece la entrega de </a:t>
-            </a:r>
-            <a:r>
-              <a:rPr lang="es-MX" sz="2800" dirty="0">
-                <a:solidFill>
-                  <a:srgbClr val="8A8A8A"/>
-                </a:solidFill>
-                <a:latin typeface="Calibri"/>
-                <a:ea typeface="Calibri"/>
-                <a:cs typeface="Calibri"/>
-                <a:sym typeface="Calibri"/>
-              </a:rPr>
-              <a:t>4</a:t>
+              <a:t>Este proyecto se centra en la implementación de un sistema de información que busca reducir los tiempos del proceso actual de la empresa Equidad S.A.S  donde se establece la entrega de 4</a:t>
             </a:r>
             <a:r>
               <a:rPr lang="es-MX" sz="2800" dirty="0" smtClean="0">
@@ -14486,36 +14474,6 @@
           <a:chExt cx="0" cy="0"/>
         </a:xfrm>
       </p:grpSpPr>
-      <p:pic>
-        <p:nvPicPr>
-          <p:cNvPr id="2" name="Imagen 1"/>
-          <p:cNvPicPr>
-            <a:picLocks noChangeAspect="1"/>
-          </p:cNvPicPr>
-          <p:nvPr/>
-        </p:nvPicPr>
-        <p:blipFill>
-          <a:blip r:embed="rId2">
-            <a:extLst>
-              <a:ext uri="{28A0092B-C50C-407E-A947-70E740481C1C}">
-                <a14:useLocalDpi xmlns:a14="http://schemas.microsoft.com/office/drawing/2010/main" val="0"/>
-              </a:ext>
-            </a:extLst>
-          </a:blip>
-          <a:stretch>
-            <a:fillRect/>
-          </a:stretch>
-        </p:blipFill>
-        <p:spPr>
-          <a:xfrm>
-            <a:off x="126776" y="1909376"/>
-            <a:ext cx="8772525" cy="4562475"/>
-          </a:xfrm>
-          <a:prstGeom prst="rect">
-            <a:avLst/>
-          </a:prstGeom>
-        </p:spPr>
-      </p:pic>
       <p:sp>
         <p:nvSpPr>
           <p:cNvPr id="15" name="14 Rectángulo"/>
@@ -15030,6 +14988,30 @@
           </a:p>
         </p:txBody>
       </p:sp>
+      <p:pic>
+        <p:nvPicPr>
+          <p:cNvPr id="3" name="Imagen 2"/>
+          <p:cNvPicPr>
+            <a:picLocks noChangeAspect="1"/>
+          </p:cNvPicPr>
+          <p:nvPr/>
+        </p:nvPicPr>
+        <p:blipFill>
+          <a:blip r:embed="rId2"/>
+          <a:stretch>
+            <a:fillRect/>
+          </a:stretch>
+        </p:blipFill>
+        <p:spPr>
+          <a:xfrm>
+            <a:off x="2037996" y="2174461"/>
+            <a:ext cx="5068007" cy="3667637"/>
+          </a:xfrm>
+          <a:prstGeom prst="rect">
+            <a:avLst/>
+          </a:prstGeom>
+        </p:spPr>
+      </p:pic>
     </p:spTree>
     <p:extLst>
       <p:ext uri="{BB962C8B-B14F-4D97-AF65-F5344CB8AC3E}">
@@ -39931,19 +39913,7 @@
                 <a:latin typeface="Calibri" panose="020F0502020204030204" pitchFamily="34" charset="0"/>
                 <a:cs typeface="Calibri" panose="020F0502020204030204" pitchFamily="34" charset="0"/>
               </a:rPr>
-              <a:t>Gestionar </a:t>
-            </a:r>
-            <a:r>
-              <a:rPr lang="es-MX" sz="2400" dirty="0" smtClean="0">
-                <a:solidFill>
-                  <a:schemeClr val="bg1">
-                    <a:lumMod val="50000"/>
-                  </a:schemeClr>
-                </a:solidFill>
-                <a:latin typeface="Calibri" panose="020F0502020204030204" pitchFamily="34" charset="0"/>
-                <a:cs typeface="Calibri" panose="020F0502020204030204" pitchFamily="34" charset="0"/>
-              </a:rPr>
-              <a:t>nominas de empleados. </a:t>
+              <a:t>Gestionar nominas de empleados. </a:t>
             </a:r>
             <a:endParaRPr lang="es-MX" sz="2400" dirty="0">
               <a:solidFill>

</xml_diff>